<commit_message>
Updated images used in UG.
</commit_message>
<xml_diff>
--- a/docs/diagrams/ContactSailsUiExplanationDiagram.pptx
+++ b/docs/diagrams/ContactSailsUiExplanationDiagram.pptx
@@ -3328,10 +3328,10 @@
       </p:grpSpPr>
       <p:pic>
         <p:nvPicPr>
-          <p:cNvPr id="3" name="Picture 2">
-            <a:extLst>
-              <a:ext uri="{FF2B5EF4-FFF2-40B4-BE49-F238E27FC236}">
-                <a16:creationId xmlns:a16="http://schemas.microsoft.com/office/drawing/2014/main" id="{5F1E6395-C2BC-4DA6-A83B-2689DCF095B6}"/>
+          <p:cNvPr id="4" name="Picture 3">
+            <a:extLst>
+              <a:ext uri="{FF2B5EF4-FFF2-40B4-BE49-F238E27FC236}">
+                <a16:creationId xmlns:a16="http://schemas.microsoft.com/office/drawing/2014/main" id="{E9F366C3-6F37-4F0C-9C6D-85AFEF66B97C}"/>
               </a:ext>
             </a:extLst>
           </p:cNvPr>
@@ -3354,8 +3354,8 @@
         </p:blipFill>
         <p:spPr>
           <a:xfrm>
-            <a:off x="1319980" y="960575"/>
-            <a:ext cx="9552039" cy="5189502"/>
+            <a:off x="1302775" y="905917"/>
+            <a:ext cx="9547120" cy="5350608"/>
           </a:xfrm>
           <a:prstGeom prst="rect">
             <a:avLst/>
@@ -3376,8 +3376,8 @@
         </p:nvSpPr>
         <p:spPr>
           <a:xfrm>
-            <a:off x="3731342" y="2300748"/>
-            <a:ext cx="4689987" cy="3510117"/>
+            <a:off x="3731343" y="2300748"/>
+            <a:ext cx="4650658" cy="3510117"/>
           </a:xfrm>
           <a:prstGeom prst="rect">
             <a:avLst/>
@@ -3428,8 +3428,8 @@
         </p:nvSpPr>
         <p:spPr>
           <a:xfrm>
-            <a:off x="8554065" y="2300748"/>
-            <a:ext cx="2197509" cy="3510117"/>
+            <a:off x="8480321" y="2300748"/>
+            <a:ext cx="2271253" cy="3510117"/>
           </a:xfrm>
           <a:prstGeom prst="rect">
             <a:avLst/>
@@ -3483,8 +3483,8 @@
         </p:nvSpPr>
         <p:spPr>
           <a:xfrm>
-            <a:off x="1371602" y="1229033"/>
-            <a:ext cx="9379972" cy="363793"/>
+            <a:off x="1401096" y="1140546"/>
+            <a:ext cx="9350477" cy="430908"/>
           </a:xfrm>
           <a:prstGeom prst="rect">
             <a:avLst/>
@@ -3539,7 +3539,7 @@
         <p:spPr>
           <a:xfrm>
             <a:off x="1425677" y="2300748"/>
-            <a:ext cx="2172929" cy="3495368"/>
+            <a:ext cx="2207345" cy="3495368"/>
           </a:xfrm>
           <a:prstGeom prst="rect">
             <a:avLst/>
@@ -3643,13 +3643,14 @@
           <p:cNvCxnSpPr>
             <a:cxnSpLocks/>
             <a:stCxn id="12" idx="1"/>
+            <a:endCxn id="25" idx="3"/>
           </p:cNvCxnSpPr>
           <p:nvPr/>
         </p:nvCxnSpPr>
         <p:spPr>
           <a:xfrm flipH="1">
-            <a:off x="1002894" y="1410930"/>
-            <a:ext cx="368708" cy="0"/>
+            <a:off x="1002892" y="1356000"/>
+            <a:ext cx="398204" cy="0"/>
           </a:xfrm>
           <a:prstGeom prst="line">
             <a:avLst/>
@@ -3781,13 +3782,15 @@
           </p:cNvPr>
           <p:cNvCxnSpPr>
             <a:cxnSpLocks/>
+            <a:stCxn id="27" idx="0"/>
+            <a:endCxn id="10" idx="2"/>
           </p:cNvCxnSpPr>
           <p:nvPr/>
         </p:nvCxnSpPr>
         <p:spPr>
           <a:xfrm flipV="1">
-            <a:off x="6095999" y="5790346"/>
-            <a:ext cx="19665" cy="471949"/>
+            <a:off x="6056672" y="5810865"/>
+            <a:ext cx="0" cy="537922"/>
           </a:xfrm>
           <a:prstGeom prst="line">
             <a:avLst/>
@@ -3827,13 +3830,14 @@
           </p:cNvPr>
           <p:cNvCxnSpPr>
             <a:cxnSpLocks/>
+            <a:stCxn id="26" idx="1"/>
           </p:cNvCxnSpPr>
           <p:nvPr/>
         </p:nvCxnSpPr>
         <p:spPr>
           <a:xfrm flipH="1">
-            <a:off x="10751574" y="4218038"/>
-            <a:ext cx="420329" cy="0"/>
+            <a:off x="10751576" y="4218038"/>
+            <a:ext cx="416330" cy="0"/>
           </a:xfrm>
           <a:prstGeom prst="line">
             <a:avLst/>
@@ -3939,7 +3943,7 @@
         </p:nvSpPr>
         <p:spPr>
           <a:xfrm>
-            <a:off x="-71285" y="1106140"/>
+            <a:off x="-88489" y="1051211"/>
             <a:ext cx="1091381" cy="609577"/>
           </a:xfrm>
           <a:prstGeom prst="roundRect">
@@ -4002,7 +4006,7 @@
         </p:nvSpPr>
         <p:spPr>
           <a:xfrm>
-            <a:off x="11171903" y="4011576"/>
+            <a:off x="11167906" y="3897262"/>
             <a:ext cx="833284" cy="641552"/>
           </a:xfrm>
           <a:prstGeom prst="roundRect">
@@ -4062,7 +4066,7 @@
         </p:nvSpPr>
         <p:spPr>
           <a:xfrm>
-            <a:off x="5502377" y="6256525"/>
+            <a:off x="5463050" y="6348787"/>
             <a:ext cx="1187243" cy="315486"/>
           </a:xfrm>
           <a:prstGeom prst="roundRect">

</xml_diff>